<commit_message>
adding pictures to the presentation
</commit_message>
<xml_diff>
--- a/APRE_Presentation.pptx
+++ b/APRE_Presentation.pptx
@@ -5,20 +5,25 @@
     <p:sldMasterId id="2147483657" r:id="rId4"/>
   </p:sldMasterIdLst>
   <p:notesMasterIdLst>
-    <p:notesMasterId r:id="rId13"/>
+    <p:notesMasterId r:id="rId18"/>
   </p:notesMasterIdLst>
   <p:handoutMasterIdLst>
-    <p:handoutMasterId r:id="rId14"/>
+    <p:handoutMasterId r:id="rId19"/>
   </p:handoutMasterIdLst>
   <p:sldIdLst>
     <p:sldId id="256" r:id="rId5"/>
     <p:sldId id="257" r:id="rId6"/>
     <p:sldId id="258" r:id="rId7"/>
-    <p:sldId id="259" r:id="rId8"/>
-    <p:sldId id="260" r:id="rId9"/>
-    <p:sldId id="262" r:id="rId10"/>
-    <p:sldId id="261" r:id="rId11"/>
-    <p:sldId id="263" r:id="rId12"/>
+    <p:sldId id="264" r:id="rId8"/>
+    <p:sldId id="265" r:id="rId9"/>
+    <p:sldId id="259" r:id="rId10"/>
+    <p:sldId id="266" r:id="rId11"/>
+    <p:sldId id="260" r:id="rId12"/>
+    <p:sldId id="267" r:id="rId13"/>
+    <p:sldId id="262" r:id="rId14"/>
+    <p:sldId id="268" r:id="rId15"/>
+    <p:sldId id="261" r:id="rId16"/>
+    <p:sldId id="263" r:id="rId17"/>
   </p:sldIdLst>
   <p:sldSz cx="12192000" cy="6858000"/>
   <p:notesSz cx="6858000" cy="9144000"/>
@@ -207,6 +212,14 @@
     </p:ext>
   </p:extLst>
 </p:presentation>
+</file>
+
+<file path=ppt/revisionInfo.xml><?xml version="1.0" encoding="utf-8"?>
+<p1510:revInfo xmlns:a="http://schemas.openxmlformats.org/drawingml/2006/main" xmlns:r="http://schemas.openxmlformats.org/officeDocument/2006/relationships" xmlns:p1510="http://schemas.microsoft.com/office/powerpoint/2015/10/main">
+  <p1510:revLst>
+    <p1510:client id="{DBFDD1D3-B9C2-5CB6-3F6A-A2263CCCEBE8}" v="229" dt="2026-01-25T09:58:41.413"/>
+  </p1510:revLst>
+</p1510:revInfo>
 </file>
 
 <file path=ppt/handoutMasters/handoutMaster1.xml><?xml version="1.0" encoding="utf-8"?>
@@ -6652,6 +6665,759 @@
 </p:sld>
 </file>
 
+<file path=ppt/slides/slide10.xml><?xml version="1.0" encoding="utf-8"?>
+<p:sld xmlns:a="http://schemas.openxmlformats.org/drawingml/2006/main" xmlns:r="http://schemas.openxmlformats.org/officeDocument/2006/relationships" xmlns:p="http://schemas.openxmlformats.org/presentationml/2006/main">
+  <p:cSld>
+    <p:spTree>
+      <p:nvGrpSpPr>
+        <p:cNvPr id="1" name="">
+          <a:extLst>
+            <a:ext uri="{FF2B5EF4-FFF2-40B4-BE49-F238E27FC236}">
+              <a16:creationId xmlns:a16="http://schemas.microsoft.com/office/drawing/2014/main" id="{B190E851-1CC3-543A-C969-C59DB152B418}"/>
+            </a:ext>
+          </a:extLst>
+        </p:cNvPr>
+        <p:cNvGrpSpPr/>
+        <p:nvPr/>
+      </p:nvGrpSpPr>
+      <p:grpSpPr>
+        <a:xfrm>
+          <a:off x="0" y="0"/>
+          <a:ext cx="0" cy="0"/>
+          <a:chOff x="0" y="0"/>
+          <a:chExt cx="0" cy="0"/>
+        </a:xfrm>
+      </p:grpSpPr>
+      <p:sp>
+        <p:nvSpPr>
+          <p:cNvPr id="2" name="Footer Placeholder 1">
+            <a:extLst>
+              <a:ext uri="{FF2B5EF4-FFF2-40B4-BE49-F238E27FC236}">
+                <a16:creationId xmlns:a16="http://schemas.microsoft.com/office/drawing/2014/main" id="{B3C52F1C-666F-EF70-C429-3ED984DD298B}"/>
+              </a:ext>
+            </a:extLst>
+          </p:cNvPr>
+          <p:cNvSpPr>
+            <a:spLocks noGrp="1"/>
+          </p:cNvSpPr>
+          <p:nvPr>
+            <p:ph type="ftr" sz="quarter" idx="10"/>
+          </p:nvPr>
+        </p:nvSpPr>
+        <p:spPr/>
+        <p:txBody>
+          <a:bodyPr/>
+          <a:lstStyle/>
+          <a:p>
+            <a:endParaRPr lang="cs-CZ" dirty="0"/>
+          </a:p>
+        </p:txBody>
+      </p:sp>
+      <p:sp>
+        <p:nvSpPr>
+          <p:cNvPr id="3" name="Slide Number Placeholder 2">
+            <a:extLst>
+              <a:ext uri="{FF2B5EF4-FFF2-40B4-BE49-F238E27FC236}">
+                <a16:creationId xmlns:a16="http://schemas.microsoft.com/office/drawing/2014/main" id="{412BDF86-9E0C-A55A-477A-4FF8FC21FFED}"/>
+              </a:ext>
+            </a:extLst>
+          </p:cNvPr>
+          <p:cNvSpPr>
+            <a:spLocks noGrp="1"/>
+          </p:cNvSpPr>
+          <p:nvPr>
+            <p:ph type="sldNum" sz="quarter" idx="11"/>
+          </p:nvPr>
+        </p:nvSpPr>
+        <p:spPr/>
+        <p:txBody>
+          <a:bodyPr/>
+          <a:lstStyle/>
+          <a:p>
+            <a:fld id="{0970407D-EE58-4A0B-824B-1D3AE42DD9CF}" type="slidenum">
+              <a:rPr lang="cs-CZ" altLang="cs-CZ" smtClean="0"/>
+              <a:pPr/>
+              <a:t>10</a:t>
+            </a:fld>
+            <a:endParaRPr lang="cs-CZ" altLang="cs-CZ" dirty="0"/>
+          </a:p>
+        </p:txBody>
+      </p:sp>
+      <p:sp>
+        <p:nvSpPr>
+          <p:cNvPr id="4" name="Title 3">
+            <a:extLst>
+              <a:ext uri="{FF2B5EF4-FFF2-40B4-BE49-F238E27FC236}">
+                <a16:creationId xmlns:a16="http://schemas.microsoft.com/office/drawing/2014/main" id="{73AD12D2-75FD-5A39-A074-F7FD4FE68317}"/>
+              </a:ext>
+            </a:extLst>
+          </p:cNvPr>
+          <p:cNvSpPr>
+            <a:spLocks noGrp="1"/>
+          </p:cNvSpPr>
+          <p:nvPr>
+            <p:ph type="title"/>
+          </p:nvPr>
+        </p:nvSpPr>
+        <p:spPr/>
+        <p:txBody>
+          <a:bodyPr/>
+          <a:lstStyle/>
+          <a:p>
+            <a:r>
+              <a:rPr lang="en-CZ" dirty="0"/>
+              <a:t>Challenger Model (LASSO)</a:t>
+            </a:r>
+          </a:p>
+        </p:txBody>
+      </p:sp>
+      <p:sp>
+        <p:nvSpPr>
+          <p:cNvPr id="5" name="Content Placeholder 4">
+            <a:extLst>
+              <a:ext uri="{FF2B5EF4-FFF2-40B4-BE49-F238E27FC236}">
+                <a16:creationId xmlns:a16="http://schemas.microsoft.com/office/drawing/2014/main" id="{65F9F921-CE42-58B3-272D-7145E4FAFC86}"/>
+              </a:ext>
+            </a:extLst>
+          </p:cNvPr>
+          <p:cNvSpPr>
+            <a:spLocks noGrp="1"/>
+          </p:cNvSpPr>
+          <p:nvPr>
+            <p:ph idx="1"/>
+          </p:nvPr>
+        </p:nvSpPr>
+        <p:spPr/>
+        <p:txBody>
+          <a:bodyPr/>
+          <a:lstStyle/>
+          <a:p>
+            <a:pPr>
+              <a:buFont typeface="Arial" panose="020B0604020202020204" pitchFamily="34" charset="0"/>
+              <a:buChar char="•"/>
+            </a:pPr>
+            <a:r>
+              <a:rPr lang="en-CZ" b="1" dirty="0"/>
+              <a:t>LASSO Regression</a:t>
+            </a:r>
+          </a:p>
+          <a:p>
+            <a:pPr lvl="1">
+              <a:buFont typeface="Arial" panose="020B0604020202020204" pitchFamily="34" charset="0"/>
+              <a:buChar char="•"/>
+            </a:pPr>
+            <a:r>
+              <a:rPr lang="en-CZ" sz="2600" dirty="0"/>
+              <a:t>Compare Machine Learning and Standard Regression (Stepwise)</a:t>
+            </a:r>
+          </a:p>
+          <a:p>
+            <a:pPr>
+              <a:buFont typeface="Arial" panose="020B0604020202020204" pitchFamily="34" charset="0"/>
+              <a:buChar char="•"/>
+            </a:pPr>
+            <a:r>
+              <a:rPr lang="en-CZ" sz="3200" b="1" dirty="0"/>
+              <a:t>Results</a:t>
+            </a:r>
+          </a:p>
+          <a:p>
+            <a:pPr lvl="1">
+              <a:buFont typeface="Arial" panose="020B0604020202020204" pitchFamily="34" charset="0"/>
+              <a:buChar char="•"/>
+            </a:pPr>
+            <a:r>
+              <a:rPr lang="en-CZ" sz="2600" dirty="0"/>
+              <a:t>Stepwise 44.51% GINI</a:t>
+            </a:r>
+          </a:p>
+          <a:p>
+            <a:pPr lvl="1">
+              <a:buFont typeface="Arial" panose="020B0604020202020204" pitchFamily="34" charset="0"/>
+              <a:buChar char="•"/>
+            </a:pPr>
+            <a:r>
+              <a:rPr lang="en-CZ" sz="2600" dirty="0"/>
+              <a:t>LASSO 44.51% GINI</a:t>
+            </a:r>
+          </a:p>
+          <a:p>
+            <a:pPr>
+              <a:buFont typeface="Arial" panose="020B0604020202020204" pitchFamily="34" charset="0"/>
+              <a:buChar char="•"/>
+            </a:pPr>
+            <a:r>
+              <a:rPr lang="en-CZ" b="1" dirty="0"/>
+              <a:t>Same Model Selection/Performance</a:t>
+            </a:r>
+          </a:p>
+          <a:p>
+            <a:pPr>
+              <a:buFont typeface="Arial" panose="020B0604020202020204" pitchFamily="34" charset="0"/>
+              <a:buChar char="•"/>
+            </a:pPr>
+            <a:endParaRPr lang="en-CZ" dirty="0"/>
+          </a:p>
+        </p:txBody>
+      </p:sp>
+    </p:spTree>
+    <p:extLst>
+      <p:ext uri="{BB962C8B-B14F-4D97-AF65-F5344CB8AC3E}">
+        <p14:creationId xmlns:p14="http://schemas.microsoft.com/office/powerpoint/2010/main" val="2021897682"/>
+      </p:ext>
+    </p:extLst>
+  </p:cSld>
+  <p:clrMapOvr>
+    <a:masterClrMapping/>
+  </p:clrMapOvr>
+</p:sld>
+</file>
+
+<file path=ppt/slides/slide11.xml><?xml version="1.0" encoding="utf-8"?>
+<p:sld xmlns:a="http://schemas.openxmlformats.org/drawingml/2006/main" xmlns:r="http://schemas.openxmlformats.org/officeDocument/2006/relationships" xmlns:p="http://schemas.openxmlformats.org/presentationml/2006/main">
+  <p:cSld>
+    <p:spTree>
+      <p:nvGrpSpPr>
+        <p:cNvPr id="1" name=""/>
+        <p:cNvGrpSpPr/>
+        <p:nvPr/>
+      </p:nvGrpSpPr>
+      <p:grpSpPr>
+        <a:xfrm>
+          <a:off x="0" y="0"/>
+          <a:ext cx="0" cy="0"/>
+          <a:chOff x="0" y="0"/>
+          <a:chExt cx="0" cy="0"/>
+        </a:xfrm>
+      </p:grpSpPr>
+      <p:sp>
+        <p:nvSpPr>
+          <p:cNvPr id="2" name="Zástupný symbol pro zápatí 1">
+            <a:extLst>
+              <a:ext uri="{FF2B5EF4-FFF2-40B4-BE49-F238E27FC236}">
+                <a16:creationId xmlns:a16="http://schemas.microsoft.com/office/drawing/2014/main" id="{39BA648E-0A7D-D02B-4551-0765C087D53F}"/>
+              </a:ext>
+            </a:extLst>
+          </p:cNvPr>
+          <p:cNvSpPr>
+            <a:spLocks noGrp="1"/>
+          </p:cNvSpPr>
+          <p:nvPr>
+            <p:ph type="ftr" sz="quarter" idx="10"/>
+          </p:nvPr>
+        </p:nvSpPr>
+        <p:spPr/>
+        <p:txBody>
+          <a:bodyPr/>
+          <a:lstStyle/>
+          <a:p>
+            <a:r>
+              <a:rPr lang="cs-CZ"/>
+              <a:t>Zápatí prezentace</a:t>
+            </a:r>
+            <a:endParaRPr lang="cs-CZ" dirty="0"/>
+          </a:p>
+        </p:txBody>
+      </p:sp>
+      <p:sp>
+        <p:nvSpPr>
+          <p:cNvPr id="3" name="Zástupný symbol pro číslo snímku 2">
+            <a:extLst>
+              <a:ext uri="{FF2B5EF4-FFF2-40B4-BE49-F238E27FC236}">
+                <a16:creationId xmlns:a16="http://schemas.microsoft.com/office/drawing/2014/main" id="{ACA5CEB3-84FA-61D2-3FE7-629D770F04BD}"/>
+              </a:ext>
+            </a:extLst>
+          </p:cNvPr>
+          <p:cNvSpPr>
+            <a:spLocks noGrp="1"/>
+          </p:cNvSpPr>
+          <p:nvPr>
+            <p:ph type="sldNum" sz="quarter" idx="11"/>
+          </p:nvPr>
+        </p:nvSpPr>
+        <p:spPr/>
+        <p:txBody>
+          <a:bodyPr/>
+          <a:lstStyle/>
+          <a:p>
+            <a:fld id="{0970407D-EE58-4A0B-824B-1D3AE42DD9CF}" type="slidenum">
+              <a:rPr lang="cs-CZ" altLang="cs-CZ"/>
+              <a:pPr/>
+              <a:t>11</a:t>
+            </a:fld>
+            <a:endParaRPr lang="cs-CZ" altLang="cs-CZ" dirty="0"/>
+          </a:p>
+        </p:txBody>
+      </p:sp>
+      <p:sp>
+        <p:nvSpPr>
+          <p:cNvPr id="4" name="Nadpis 3">
+            <a:extLst>
+              <a:ext uri="{FF2B5EF4-FFF2-40B4-BE49-F238E27FC236}">
+                <a16:creationId xmlns:a16="http://schemas.microsoft.com/office/drawing/2014/main" id="{DF85ECBC-686A-98F7-187F-2ECAC3163EE2}"/>
+              </a:ext>
+            </a:extLst>
+          </p:cNvPr>
+          <p:cNvSpPr>
+            <a:spLocks noGrp="1"/>
+          </p:cNvSpPr>
+          <p:nvPr>
+            <p:ph type="title"/>
+          </p:nvPr>
+        </p:nvSpPr>
+        <p:spPr/>
+        <p:txBody>
+          <a:bodyPr/>
+          <a:lstStyle/>
+          <a:p>
+            <a:r>
+              <a:rPr lang="cs-CZ" dirty="0" err="1">
+                <a:cs typeface="Arial"/>
+              </a:rPr>
+              <a:t>Stepwise</a:t>
+            </a:r>
+            <a:r>
+              <a:rPr lang="cs-CZ" dirty="0">
+                <a:cs typeface="Arial"/>
+              </a:rPr>
+              <a:t> vs LASSO </a:t>
+            </a:r>
+            <a:r>
+              <a:rPr lang="cs-CZ" dirty="0" err="1">
+                <a:cs typeface="Arial"/>
+              </a:rPr>
+              <a:t>Comparison</a:t>
+            </a:r>
+            <a:endParaRPr lang="cs-CZ" dirty="0" err="1"/>
+          </a:p>
+        </p:txBody>
+      </p:sp>
+      <p:pic>
+        <p:nvPicPr>
+          <p:cNvPr id="6" name="Zástupný obsah 5" descr="Obsah obrázku text, diagram, řada/pruh, Vykreslený graf&#10;&#10;Obsah generovaný pomocí AI může být nesprávný.">
+            <a:extLst>
+              <a:ext uri="{FF2B5EF4-FFF2-40B4-BE49-F238E27FC236}">
+                <a16:creationId xmlns:a16="http://schemas.microsoft.com/office/drawing/2014/main" id="{CC143F6C-2B16-A960-D124-1BAA71674EBF}"/>
+              </a:ext>
+            </a:extLst>
+          </p:cNvPr>
+          <p:cNvPicPr>
+            <a:picLocks noGrp="1" noChangeAspect="1"/>
+          </p:cNvPicPr>
+          <p:nvPr>
+            <p:ph idx="1"/>
+          </p:nvPr>
+        </p:nvPicPr>
+        <p:blipFill>
+          <a:blip r:embed="rId2"/>
+          <a:stretch>
+            <a:fillRect/>
+          </a:stretch>
+        </p:blipFill>
+        <p:spPr>
+          <a:xfrm>
+            <a:off x="2446526" y="1559708"/>
+            <a:ext cx="7290740" cy="4282290"/>
+          </a:xfrm>
+          <a:prstGeom prst="rect">
+            <a:avLst/>
+          </a:prstGeom>
+        </p:spPr>
+      </p:pic>
+    </p:spTree>
+    <p:extLst>
+      <p:ext uri="{BB962C8B-B14F-4D97-AF65-F5344CB8AC3E}">
+        <p14:creationId xmlns:p14="http://schemas.microsoft.com/office/powerpoint/2010/main" val="4022396676"/>
+      </p:ext>
+    </p:extLst>
+  </p:cSld>
+  <p:clrMapOvr>
+    <a:masterClrMapping/>
+  </p:clrMapOvr>
+</p:sld>
+</file>
+
+<file path=ppt/slides/slide12.xml><?xml version="1.0" encoding="utf-8"?>
+<p:sld xmlns:a="http://schemas.openxmlformats.org/drawingml/2006/main" xmlns:r="http://schemas.openxmlformats.org/officeDocument/2006/relationships" xmlns:p="http://schemas.openxmlformats.org/presentationml/2006/main">
+  <p:cSld>
+    <p:spTree>
+      <p:nvGrpSpPr>
+        <p:cNvPr id="1" name="">
+          <a:extLst>
+            <a:ext uri="{FF2B5EF4-FFF2-40B4-BE49-F238E27FC236}">
+              <a16:creationId xmlns:a16="http://schemas.microsoft.com/office/drawing/2014/main" id="{7560FF15-CAC9-E89A-DABE-F8E95FD35475}"/>
+            </a:ext>
+          </a:extLst>
+        </p:cNvPr>
+        <p:cNvGrpSpPr/>
+        <p:nvPr/>
+      </p:nvGrpSpPr>
+      <p:grpSpPr>
+        <a:xfrm>
+          <a:off x="0" y="0"/>
+          <a:ext cx="0" cy="0"/>
+          <a:chOff x="0" y="0"/>
+          <a:chExt cx="0" cy="0"/>
+        </a:xfrm>
+      </p:grpSpPr>
+      <p:sp>
+        <p:nvSpPr>
+          <p:cNvPr id="2" name="Footer Placeholder 1">
+            <a:extLst>
+              <a:ext uri="{FF2B5EF4-FFF2-40B4-BE49-F238E27FC236}">
+                <a16:creationId xmlns:a16="http://schemas.microsoft.com/office/drawing/2014/main" id="{3F2DF2F1-060E-211C-74C8-87FE1DB92DC6}"/>
+              </a:ext>
+            </a:extLst>
+          </p:cNvPr>
+          <p:cNvSpPr>
+            <a:spLocks noGrp="1"/>
+          </p:cNvSpPr>
+          <p:nvPr>
+            <p:ph type="ftr" sz="quarter" idx="10"/>
+          </p:nvPr>
+        </p:nvSpPr>
+        <p:spPr/>
+        <p:txBody>
+          <a:bodyPr/>
+          <a:lstStyle/>
+          <a:p>
+            <a:endParaRPr lang="cs-CZ" dirty="0"/>
+          </a:p>
+        </p:txBody>
+      </p:sp>
+      <p:sp>
+        <p:nvSpPr>
+          <p:cNvPr id="3" name="Slide Number Placeholder 2">
+            <a:extLst>
+              <a:ext uri="{FF2B5EF4-FFF2-40B4-BE49-F238E27FC236}">
+                <a16:creationId xmlns:a16="http://schemas.microsoft.com/office/drawing/2014/main" id="{C73E2FB3-0E20-61DD-34D6-9B2F5B7F87EC}"/>
+              </a:ext>
+            </a:extLst>
+          </p:cNvPr>
+          <p:cNvSpPr>
+            <a:spLocks noGrp="1"/>
+          </p:cNvSpPr>
+          <p:nvPr>
+            <p:ph type="sldNum" sz="quarter" idx="11"/>
+          </p:nvPr>
+        </p:nvSpPr>
+        <p:spPr/>
+        <p:txBody>
+          <a:bodyPr/>
+          <a:lstStyle/>
+          <a:p>
+            <a:fld id="{0970407D-EE58-4A0B-824B-1D3AE42DD9CF}" type="slidenum">
+              <a:rPr lang="cs-CZ" altLang="cs-CZ" smtClean="0"/>
+              <a:pPr/>
+              <a:t>12</a:t>
+            </a:fld>
+            <a:endParaRPr lang="cs-CZ" altLang="cs-CZ" dirty="0"/>
+          </a:p>
+        </p:txBody>
+      </p:sp>
+      <p:sp>
+        <p:nvSpPr>
+          <p:cNvPr id="4" name="Title 3">
+            <a:extLst>
+              <a:ext uri="{FF2B5EF4-FFF2-40B4-BE49-F238E27FC236}">
+                <a16:creationId xmlns:a16="http://schemas.microsoft.com/office/drawing/2014/main" id="{A083CF8F-2CB7-880E-7CF0-9EC5011D8EE7}"/>
+              </a:ext>
+            </a:extLst>
+          </p:cNvPr>
+          <p:cNvSpPr>
+            <a:spLocks noGrp="1"/>
+          </p:cNvSpPr>
+          <p:nvPr>
+            <p:ph type="title"/>
+          </p:nvPr>
+        </p:nvSpPr>
+        <p:spPr/>
+        <p:txBody>
+          <a:bodyPr/>
+          <a:lstStyle/>
+          <a:p>
+            <a:r>
+              <a:rPr lang="en-CZ" dirty="0"/>
+              <a:t>Summary</a:t>
+            </a:r>
+          </a:p>
+        </p:txBody>
+      </p:sp>
+      <p:sp>
+        <p:nvSpPr>
+          <p:cNvPr id="5" name="Content Placeholder 4">
+            <a:extLst>
+              <a:ext uri="{FF2B5EF4-FFF2-40B4-BE49-F238E27FC236}">
+                <a16:creationId xmlns:a16="http://schemas.microsoft.com/office/drawing/2014/main" id="{8EB12ED1-D642-FC50-8A60-D2F0F3F283D4}"/>
+              </a:ext>
+            </a:extLst>
+          </p:cNvPr>
+          <p:cNvSpPr>
+            <a:spLocks noGrp="1"/>
+          </p:cNvSpPr>
+          <p:nvPr>
+            <p:ph idx="1"/>
+          </p:nvPr>
+        </p:nvSpPr>
+        <p:spPr/>
+        <p:txBody>
+          <a:bodyPr/>
+          <a:lstStyle/>
+          <a:p>
+            <a:pPr>
+              <a:buFont typeface="Arial" panose="020B0604020202020204" pitchFamily="34" charset="0"/>
+              <a:buChar char="•"/>
+            </a:pPr>
+            <a:r>
+              <a:rPr lang="en-CZ" dirty="0"/>
+              <a:t>Target 12-Month Window (Default = 1)</a:t>
+            </a:r>
+          </a:p>
+          <a:p>
+            <a:pPr>
+              <a:buFont typeface="Arial" panose="020B0604020202020204" pitchFamily="34" charset="0"/>
+              <a:buChar char="•"/>
+            </a:pPr>
+            <a:r>
+              <a:rPr lang="en-CZ" dirty="0"/>
+              <a:t>Stratified Random Split (70/30) with WoE Binning</a:t>
+            </a:r>
+          </a:p>
+          <a:p>
+            <a:pPr>
+              <a:buFont typeface="Arial" panose="020B0604020202020204" pitchFamily="34" charset="0"/>
+              <a:buChar char="•"/>
+            </a:pPr>
+            <a:r>
+              <a:rPr lang="en-CZ" dirty="0"/>
+              <a:t>Stepwise Logistic Regression (AIC Selection)</a:t>
+            </a:r>
+          </a:p>
+          <a:p>
+            <a:pPr>
+              <a:buFont typeface="Arial" panose="020B0604020202020204" pitchFamily="34" charset="0"/>
+              <a:buChar char="•"/>
+            </a:pPr>
+            <a:r>
+              <a:rPr lang="en-CZ" dirty="0"/>
+              <a:t>Checks for Correlation and VIF</a:t>
+            </a:r>
+          </a:p>
+          <a:p>
+            <a:pPr>
+              <a:buFont typeface="Arial" panose="020B0604020202020204" pitchFamily="34" charset="0"/>
+              <a:buChar char="•"/>
+            </a:pPr>
+            <a:r>
+              <a:rPr lang="en-CZ" dirty="0"/>
+              <a:t>GINI 44.5% (Strong predictive power)</a:t>
+            </a:r>
+          </a:p>
+          <a:p>
+            <a:pPr>
+              <a:buFont typeface="Arial" panose="020B0604020202020204" pitchFamily="34" charset="0"/>
+              <a:buChar char="•"/>
+            </a:pPr>
+            <a:r>
+              <a:rPr lang="en-CZ" dirty="0"/>
+              <a:t>No Gap between Train/Test (Robust)</a:t>
+            </a:r>
+          </a:p>
+          <a:p>
+            <a:pPr>
+              <a:buFont typeface="Arial" panose="020B0604020202020204" pitchFamily="34" charset="0"/>
+              <a:buChar char="•"/>
+            </a:pPr>
+            <a:r>
+              <a:rPr lang="en-CZ" dirty="0"/>
+              <a:t>PSI 0.05 on Blind Data (Stability)</a:t>
+            </a:r>
+          </a:p>
+          <a:p>
+            <a:pPr>
+              <a:buFont typeface="Arial" panose="020B0604020202020204" pitchFamily="34" charset="0"/>
+              <a:buChar char="•"/>
+            </a:pPr>
+            <a:r>
+              <a:rPr lang="en-CZ" dirty="0"/>
+              <a:t>ML LASSO Same Performance</a:t>
+            </a:r>
+          </a:p>
+          <a:p>
+            <a:pPr>
+              <a:buFont typeface="Arial" panose="020B0604020202020204" pitchFamily="34" charset="0"/>
+              <a:buChar char="•"/>
+            </a:pPr>
+            <a:endParaRPr lang="en-CZ" dirty="0"/>
+          </a:p>
+        </p:txBody>
+      </p:sp>
+    </p:spTree>
+    <p:extLst>
+      <p:ext uri="{BB962C8B-B14F-4D97-AF65-F5344CB8AC3E}">
+        <p14:creationId xmlns:p14="http://schemas.microsoft.com/office/powerpoint/2010/main" val="1233207359"/>
+      </p:ext>
+    </p:extLst>
+  </p:cSld>
+  <p:clrMapOvr>
+    <a:masterClrMapping/>
+  </p:clrMapOvr>
+</p:sld>
+</file>
+
+<file path=ppt/slides/slide13.xml><?xml version="1.0" encoding="utf-8"?>
+<p:sld xmlns:a="http://schemas.openxmlformats.org/drawingml/2006/main" xmlns:r="http://schemas.openxmlformats.org/officeDocument/2006/relationships" xmlns:p="http://schemas.openxmlformats.org/presentationml/2006/main">
+  <p:cSld>
+    <p:spTree>
+      <p:nvGrpSpPr>
+        <p:cNvPr id="1" name="">
+          <a:extLst>
+            <a:ext uri="{FF2B5EF4-FFF2-40B4-BE49-F238E27FC236}">
+              <a16:creationId xmlns:a16="http://schemas.microsoft.com/office/drawing/2014/main" id="{B42E7432-DB6E-CF97-D96C-B06FC96989F7}"/>
+            </a:ext>
+          </a:extLst>
+        </p:cNvPr>
+        <p:cNvGrpSpPr/>
+        <p:nvPr/>
+      </p:nvGrpSpPr>
+      <p:grpSpPr>
+        <a:xfrm>
+          <a:off x="0" y="0"/>
+          <a:ext cx="0" cy="0"/>
+          <a:chOff x="0" y="0"/>
+          <a:chExt cx="0" cy="0"/>
+        </a:xfrm>
+      </p:grpSpPr>
+      <p:sp>
+        <p:nvSpPr>
+          <p:cNvPr id="2" name="Footer Placeholder 1">
+            <a:extLst>
+              <a:ext uri="{FF2B5EF4-FFF2-40B4-BE49-F238E27FC236}">
+                <a16:creationId xmlns:a16="http://schemas.microsoft.com/office/drawing/2014/main" id="{A9674981-1D35-EF3B-4584-4BA0FEB42834}"/>
+              </a:ext>
+            </a:extLst>
+          </p:cNvPr>
+          <p:cNvSpPr>
+            <a:spLocks noGrp="1"/>
+          </p:cNvSpPr>
+          <p:nvPr>
+            <p:ph type="ftr" sz="quarter" idx="10"/>
+          </p:nvPr>
+        </p:nvSpPr>
+        <p:spPr/>
+        <p:txBody>
+          <a:bodyPr/>
+          <a:lstStyle/>
+          <a:p>
+            <a:endParaRPr lang="cs-CZ" dirty="0"/>
+          </a:p>
+        </p:txBody>
+      </p:sp>
+      <p:sp>
+        <p:nvSpPr>
+          <p:cNvPr id="3" name="Slide Number Placeholder 2">
+            <a:extLst>
+              <a:ext uri="{FF2B5EF4-FFF2-40B4-BE49-F238E27FC236}">
+                <a16:creationId xmlns:a16="http://schemas.microsoft.com/office/drawing/2014/main" id="{5D807617-6DBF-7FC0-B1B9-427A24EE7C9C}"/>
+              </a:ext>
+            </a:extLst>
+          </p:cNvPr>
+          <p:cNvSpPr>
+            <a:spLocks noGrp="1"/>
+          </p:cNvSpPr>
+          <p:nvPr>
+            <p:ph type="sldNum" sz="quarter" idx="11"/>
+          </p:nvPr>
+        </p:nvSpPr>
+        <p:spPr/>
+        <p:txBody>
+          <a:bodyPr/>
+          <a:lstStyle/>
+          <a:p>
+            <a:fld id="{0970407D-EE58-4A0B-824B-1D3AE42DD9CF}" type="slidenum">
+              <a:rPr lang="cs-CZ" altLang="cs-CZ" smtClean="0"/>
+              <a:pPr/>
+              <a:t>13</a:t>
+            </a:fld>
+            <a:endParaRPr lang="cs-CZ" altLang="cs-CZ" dirty="0"/>
+          </a:p>
+        </p:txBody>
+      </p:sp>
+      <p:sp>
+        <p:nvSpPr>
+          <p:cNvPr id="4" name="Title 3">
+            <a:extLst>
+              <a:ext uri="{FF2B5EF4-FFF2-40B4-BE49-F238E27FC236}">
+                <a16:creationId xmlns:a16="http://schemas.microsoft.com/office/drawing/2014/main" id="{47FE0764-65CF-D401-6320-156B53426A5A}"/>
+              </a:ext>
+            </a:extLst>
+          </p:cNvPr>
+          <p:cNvSpPr>
+            <a:spLocks noGrp="1"/>
+          </p:cNvSpPr>
+          <p:nvPr>
+            <p:ph type="title"/>
+          </p:nvPr>
+        </p:nvSpPr>
+        <p:spPr>
+          <a:xfrm>
+            <a:off x="4755019" y="3310425"/>
+            <a:ext cx="2681961" cy="451576"/>
+          </a:xfrm>
+        </p:spPr>
+        <p:txBody>
+          <a:bodyPr/>
+          <a:lstStyle/>
+          <a:p>
+            <a:r>
+              <a:rPr lang="en-CZ" dirty="0"/>
+              <a:t>Thank You</a:t>
+            </a:r>
+          </a:p>
+        </p:txBody>
+      </p:sp>
+      <p:sp>
+        <p:nvSpPr>
+          <p:cNvPr id="5" name="Content Placeholder 4">
+            <a:extLst>
+              <a:ext uri="{FF2B5EF4-FFF2-40B4-BE49-F238E27FC236}">
+                <a16:creationId xmlns:a16="http://schemas.microsoft.com/office/drawing/2014/main" id="{37F7924D-3BB6-F27D-7B0B-79CD01E6D156}"/>
+              </a:ext>
+            </a:extLst>
+          </p:cNvPr>
+          <p:cNvSpPr>
+            <a:spLocks noGrp="1"/>
+          </p:cNvSpPr>
+          <p:nvPr>
+            <p:ph idx="1"/>
+          </p:nvPr>
+        </p:nvSpPr>
+        <p:spPr/>
+        <p:txBody>
+          <a:bodyPr/>
+          <a:lstStyle/>
+          <a:p>
+            <a:pPr>
+              <a:buFont typeface="Arial" panose="020B0604020202020204" pitchFamily="34" charset="0"/>
+              <a:buChar char="•"/>
+            </a:pPr>
+            <a:endParaRPr lang="en-CZ" dirty="0"/>
+          </a:p>
+        </p:txBody>
+      </p:sp>
+    </p:spTree>
+    <p:extLst>
+      <p:ext uri="{BB962C8B-B14F-4D97-AF65-F5344CB8AC3E}">
+        <p14:creationId xmlns:p14="http://schemas.microsoft.com/office/powerpoint/2010/main" val="1899333622"/>
+      </p:ext>
+    </p:extLst>
+  </p:cSld>
+  <p:clrMapOvr>
+    <a:masterClrMapping/>
+  </p:clrMapOvr>
+</p:sld>
+</file>
+
 <file path=ppt/slides/slide2.xml><?xml version="1.0" encoding="utf-8"?>
 <p:sld xmlns:a="http://schemas.openxmlformats.org/drawingml/2006/main" xmlns:r="http://schemas.openxmlformats.org/officeDocument/2006/relationships" xmlns:p="http://schemas.openxmlformats.org/presentationml/2006/main">
   <p:cSld>
@@ -7110,6 +7876,381 @@
   <p:cSld>
     <p:spTree>
       <p:nvGrpSpPr>
+        <p:cNvPr id="1" name=""/>
+        <p:cNvGrpSpPr/>
+        <p:nvPr/>
+      </p:nvGrpSpPr>
+      <p:grpSpPr>
+        <a:xfrm>
+          <a:off x="0" y="0"/>
+          <a:ext cx="0" cy="0"/>
+          <a:chOff x="0" y="0"/>
+          <a:chExt cx="0" cy="0"/>
+        </a:xfrm>
+      </p:grpSpPr>
+      <p:sp>
+        <p:nvSpPr>
+          <p:cNvPr id="2" name="Zástupný symbol pro zápatí 1">
+            <a:extLst>
+              <a:ext uri="{FF2B5EF4-FFF2-40B4-BE49-F238E27FC236}">
+                <a16:creationId xmlns:a16="http://schemas.microsoft.com/office/drawing/2014/main" id="{E36B269E-4042-D959-66B3-78FFEB810A08}"/>
+              </a:ext>
+            </a:extLst>
+          </p:cNvPr>
+          <p:cNvSpPr>
+            <a:spLocks noGrp="1"/>
+          </p:cNvSpPr>
+          <p:nvPr>
+            <p:ph type="ftr" sz="quarter" idx="10"/>
+          </p:nvPr>
+        </p:nvSpPr>
+        <p:spPr/>
+        <p:txBody>
+          <a:bodyPr/>
+          <a:lstStyle/>
+          <a:p>
+            <a:r>
+              <a:rPr lang="cs-CZ" dirty="0"/>
+              <a:t>Zápatí prezentace</a:t>
+            </a:r>
+          </a:p>
+        </p:txBody>
+      </p:sp>
+      <p:sp>
+        <p:nvSpPr>
+          <p:cNvPr id="3" name="Zástupný symbol pro číslo snímku 2">
+            <a:extLst>
+              <a:ext uri="{FF2B5EF4-FFF2-40B4-BE49-F238E27FC236}">
+                <a16:creationId xmlns:a16="http://schemas.microsoft.com/office/drawing/2014/main" id="{83C1237C-DBC8-B713-8CE5-D1278A2CD79A}"/>
+              </a:ext>
+            </a:extLst>
+          </p:cNvPr>
+          <p:cNvSpPr>
+            <a:spLocks noGrp="1"/>
+          </p:cNvSpPr>
+          <p:nvPr>
+            <p:ph type="sldNum" sz="quarter" idx="11"/>
+          </p:nvPr>
+        </p:nvSpPr>
+        <p:spPr/>
+        <p:txBody>
+          <a:bodyPr/>
+          <a:lstStyle/>
+          <a:p>
+            <a:fld id="{0970407D-EE58-4A0B-824B-1D3AE42DD9CF}" type="slidenum">
+              <a:rPr lang="cs-CZ" altLang="cs-CZ"/>
+              <a:pPr/>
+              <a:t>4</a:t>
+            </a:fld>
+            <a:endParaRPr lang="cs-CZ" altLang="cs-CZ" dirty="0"/>
+          </a:p>
+        </p:txBody>
+      </p:sp>
+      <p:sp>
+        <p:nvSpPr>
+          <p:cNvPr id="4" name="Nadpis 3">
+            <a:extLst>
+              <a:ext uri="{FF2B5EF4-FFF2-40B4-BE49-F238E27FC236}">
+                <a16:creationId xmlns:a16="http://schemas.microsoft.com/office/drawing/2014/main" id="{86E829BF-F3AF-0388-A529-E33A4BBB2058}"/>
+              </a:ext>
+            </a:extLst>
+          </p:cNvPr>
+          <p:cNvSpPr>
+            <a:spLocks noGrp="1"/>
+          </p:cNvSpPr>
+          <p:nvPr>
+            <p:ph type="title"/>
+          </p:nvPr>
+        </p:nvSpPr>
+        <p:spPr/>
+        <p:txBody>
+          <a:bodyPr/>
+          <a:lstStyle/>
+          <a:p>
+            <a:r>
+              <a:rPr lang="cs-CZ" dirty="0" err="1">
+                <a:cs typeface="Arial"/>
+              </a:rPr>
+              <a:t>Correlation</a:t>
+            </a:r>
+            <a:r>
+              <a:rPr lang="cs-CZ" dirty="0">
+                <a:cs typeface="Arial"/>
+              </a:rPr>
+              <a:t> Matrix </a:t>
+            </a:r>
+            <a:r>
+              <a:rPr lang="cs-CZ" dirty="0" err="1">
+                <a:cs typeface="Arial"/>
+              </a:rPr>
+              <a:t>Before</a:t>
+            </a:r>
+            <a:r>
+              <a:rPr lang="cs-CZ" dirty="0">
+                <a:cs typeface="Arial"/>
+              </a:rPr>
+              <a:t> </a:t>
+            </a:r>
+            <a:r>
+              <a:rPr lang="cs-CZ" dirty="0" err="1">
+                <a:cs typeface="Arial"/>
+              </a:rPr>
+              <a:t>Cleaning</a:t>
+            </a:r>
+            <a:endParaRPr lang="cs-CZ" dirty="0" err="1"/>
+          </a:p>
+        </p:txBody>
+      </p:sp>
+      <p:pic>
+        <p:nvPicPr>
+          <p:cNvPr id="6" name="Zástupný obsah 5" descr="Obsah obrázku text, snímek obrazovky, diagram, Vykreslený graf&#10;&#10;Obsah generovaný pomocí AI může být nesprávný.">
+            <a:extLst>
+              <a:ext uri="{FF2B5EF4-FFF2-40B4-BE49-F238E27FC236}">
+                <a16:creationId xmlns:a16="http://schemas.microsoft.com/office/drawing/2014/main" id="{7C6827FF-A974-4560-97BB-F3C12FE8F055}"/>
+              </a:ext>
+            </a:extLst>
+          </p:cNvPr>
+          <p:cNvPicPr>
+            <a:picLocks noGrp="1" noChangeAspect="1"/>
+          </p:cNvPicPr>
+          <p:nvPr>
+            <p:ph idx="1"/>
+          </p:nvPr>
+        </p:nvPicPr>
+        <p:blipFill>
+          <a:blip r:embed="rId2"/>
+          <a:stretch>
+            <a:fillRect/>
+          </a:stretch>
+        </p:blipFill>
+        <p:spPr>
+          <a:xfrm>
+            <a:off x="540585" y="1716248"/>
+            <a:ext cx="6319520" cy="3708815"/>
+          </a:xfrm>
+          <a:prstGeom prst="rect">
+            <a:avLst/>
+          </a:prstGeom>
+        </p:spPr>
+      </p:pic>
+      <p:pic>
+        <p:nvPicPr>
+          <p:cNvPr id="10" name="Obrázek 9" descr="Obsah obrázku text, snímek obrazovky, diagram, řada/pruh&#10;&#10;Obsah generovaný pomocí AI může být nesprávný.">
+            <a:extLst>
+              <a:ext uri="{FF2B5EF4-FFF2-40B4-BE49-F238E27FC236}">
+                <a16:creationId xmlns:a16="http://schemas.microsoft.com/office/drawing/2014/main" id="{E221D9B8-181C-98FD-61EF-D56F09794C5C}"/>
+              </a:ext>
+            </a:extLst>
+          </p:cNvPr>
+          <p:cNvPicPr>
+            <a:picLocks noChangeAspect="1"/>
+          </p:cNvPicPr>
+          <p:nvPr/>
+        </p:nvPicPr>
+        <p:blipFill>
+          <a:blip r:embed="rId3"/>
+          <a:stretch>
+            <a:fillRect/>
+          </a:stretch>
+        </p:blipFill>
+        <p:spPr>
+          <a:xfrm>
+            <a:off x="5887861" y="1866489"/>
+            <a:ext cx="5910203" cy="3557763"/>
+          </a:xfrm>
+          <a:prstGeom prst="rect">
+            <a:avLst/>
+          </a:prstGeom>
+        </p:spPr>
+      </p:pic>
+    </p:spTree>
+    <p:extLst>
+      <p:ext uri="{BB962C8B-B14F-4D97-AF65-F5344CB8AC3E}">
+        <p14:creationId xmlns:p14="http://schemas.microsoft.com/office/powerpoint/2010/main" val="2545728649"/>
+      </p:ext>
+    </p:extLst>
+  </p:cSld>
+  <p:clrMapOvr>
+    <a:masterClrMapping/>
+  </p:clrMapOvr>
+</p:sld>
+</file>
+
+<file path=ppt/slides/slide5.xml><?xml version="1.0" encoding="utf-8"?>
+<p:sld xmlns:a="http://schemas.openxmlformats.org/drawingml/2006/main" xmlns:r="http://schemas.openxmlformats.org/officeDocument/2006/relationships" xmlns:p="http://schemas.openxmlformats.org/presentationml/2006/main">
+  <p:cSld>
+    <p:spTree>
+      <p:nvGrpSpPr>
+        <p:cNvPr id="1" name=""/>
+        <p:cNvGrpSpPr/>
+        <p:nvPr/>
+      </p:nvGrpSpPr>
+      <p:grpSpPr>
+        <a:xfrm>
+          <a:off x="0" y="0"/>
+          <a:ext cx="0" cy="0"/>
+          <a:chOff x="0" y="0"/>
+          <a:chExt cx="0" cy="0"/>
+        </a:xfrm>
+      </p:grpSpPr>
+      <p:sp>
+        <p:nvSpPr>
+          <p:cNvPr id="2" name="Zástupný symbol pro zápatí 1">
+            <a:extLst>
+              <a:ext uri="{FF2B5EF4-FFF2-40B4-BE49-F238E27FC236}">
+                <a16:creationId xmlns:a16="http://schemas.microsoft.com/office/drawing/2014/main" id="{D45FA9E2-188B-188E-F29F-9C7D9A7A72AE}"/>
+              </a:ext>
+            </a:extLst>
+          </p:cNvPr>
+          <p:cNvSpPr>
+            <a:spLocks noGrp="1"/>
+          </p:cNvSpPr>
+          <p:nvPr>
+            <p:ph type="ftr" sz="quarter" idx="10"/>
+          </p:nvPr>
+        </p:nvSpPr>
+        <p:spPr/>
+        <p:txBody>
+          <a:bodyPr/>
+          <a:lstStyle/>
+          <a:p>
+            <a:r>
+              <a:rPr lang="cs-CZ"/>
+              <a:t>Zápatí prezentace</a:t>
+            </a:r>
+            <a:endParaRPr lang="cs-CZ" dirty="0"/>
+          </a:p>
+        </p:txBody>
+      </p:sp>
+      <p:sp>
+        <p:nvSpPr>
+          <p:cNvPr id="3" name="Zástupný symbol pro číslo snímku 2">
+            <a:extLst>
+              <a:ext uri="{FF2B5EF4-FFF2-40B4-BE49-F238E27FC236}">
+                <a16:creationId xmlns:a16="http://schemas.microsoft.com/office/drawing/2014/main" id="{C288B033-FC9D-B22D-C99B-FAFCBFDE37B7}"/>
+              </a:ext>
+            </a:extLst>
+          </p:cNvPr>
+          <p:cNvSpPr>
+            <a:spLocks noGrp="1"/>
+          </p:cNvSpPr>
+          <p:nvPr>
+            <p:ph type="sldNum" sz="quarter" idx="11"/>
+          </p:nvPr>
+        </p:nvSpPr>
+        <p:spPr/>
+        <p:txBody>
+          <a:bodyPr/>
+          <a:lstStyle/>
+          <a:p>
+            <a:fld id="{0970407D-EE58-4A0B-824B-1D3AE42DD9CF}" type="slidenum">
+              <a:rPr lang="cs-CZ" altLang="cs-CZ"/>
+              <a:pPr/>
+              <a:t>5</a:t>
+            </a:fld>
+            <a:endParaRPr lang="cs-CZ" altLang="cs-CZ" dirty="0"/>
+          </a:p>
+        </p:txBody>
+      </p:sp>
+      <p:sp>
+        <p:nvSpPr>
+          <p:cNvPr id="4" name="Nadpis 3">
+            <a:extLst>
+              <a:ext uri="{FF2B5EF4-FFF2-40B4-BE49-F238E27FC236}">
+                <a16:creationId xmlns:a16="http://schemas.microsoft.com/office/drawing/2014/main" id="{4938484E-CAD3-D4CB-9C0E-76FDBF4C8F4F}"/>
+              </a:ext>
+            </a:extLst>
+          </p:cNvPr>
+          <p:cNvSpPr>
+            <a:spLocks noGrp="1"/>
+          </p:cNvSpPr>
+          <p:nvPr>
+            <p:ph type="title"/>
+          </p:nvPr>
+        </p:nvSpPr>
+        <p:spPr/>
+        <p:txBody>
+          <a:bodyPr/>
+          <a:lstStyle/>
+          <a:p>
+            <a:r>
+              <a:rPr lang="cs-CZ" dirty="0">
+                <a:cs typeface="Arial"/>
+              </a:rPr>
+              <a:t>Target </a:t>
+            </a:r>
+            <a:r>
+              <a:rPr lang="cs-CZ" dirty="0" err="1">
+                <a:cs typeface="Arial"/>
+              </a:rPr>
+              <a:t>Value</a:t>
+            </a:r>
+            <a:r>
+              <a:rPr lang="cs-CZ" dirty="0">
+                <a:cs typeface="Arial"/>
+              </a:rPr>
+              <a:t> </a:t>
+            </a:r>
+            <a:r>
+              <a:rPr lang="cs-CZ" dirty="0" err="1">
+                <a:cs typeface="Arial"/>
+              </a:rPr>
+              <a:t>Distribution</a:t>
+            </a:r>
+            <a:endParaRPr lang="cs-CZ" dirty="0" err="1"/>
+          </a:p>
+        </p:txBody>
+      </p:sp>
+      <p:pic>
+        <p:nvPicPr>
+          <p:cNvPr id="9" name="Zástupný obsah 8" descr="Obsah obrázku text, snímek obrazovky, diagram, Obdélník&#10;&#10;Obsah generovaný pomocí AI může být nesprávný.">
+            <a:extLst>
+              <a:ext uri="{FF2B5EF4-FFF2-40B4-BE49-F238E27FC236}">
+                <a16:creationId xmlns:a16="http://schemas.microsoft.com/office/drawing/2014/main" id="{40F34CCD-F681-E541-20E3-0E56A2CB2FC6}"/>
+              </a:ext>
+            </a:extLst>
+          </p:cNvPr>
+          <p:cNvPicPr>
+            <a:picLocks noGrp="1" noChangeAspect="1"/>
+          </p:cNvPicPr>
+          <p:nvPr>
+            <p:ph idx="1"/>
+          </p:nvPr>
+        </p:nvPicPr>
+        <p:blipFill>
+          <a:blip r:embed="rId2"/>
+          <a:stretch>
+            <a:fillRect/>
+          </a:stretch>
+        </p:blipFill>
+        <p:spPr>
+          <a:xfrm>
+            <a:off x="3048600" y="1973634"/>
+            <a:ext cx="6096000" cy="3576735"/>
+          </a:xfrm>
+          <a:prstGeom prst="rect">
+            <a:avLst/>
+          </a:prstGeom>
+        </p:spPr>
+      </p:pic>
+    </p:spTree>
+    <p:extLst>
+      <p:ext uri="{BB962C8B-B14F-4D97-AF65-F5344CB8AC3E}">
+        <p14:creationId xmlns:p14="http://schemas.microsoft.com/office/powerpoint/2010/main" val="4215864990"/>
+      </p:ext>
+    </p:extLst>
+  </p:cSld>
+  <p:clrMapOvr>
+    <a:masterClrMapping/>
+  </p:clrMapOvr>
+</p:sld>
+</file>
+
+<file path=ppt/slides/slide6.xml><?xml version="1.0" encoding="utf-8"?>
+<p:sld xmlns:a="http://schemas.openxmlformats.org/drawingml/2006/main" xmlns:r="http://schemas.openxmlformats.org/officeDocument/2006/relationships" xmlns:p="http://schemas.openxmlformats.org/presentationml/2006/main">
+  <p:cSld>
+    <p:spTree>
+      <p:nvGrpSpPr>
         <p:cNvPr id="1" name="">
           <a:extLst>
             <a:ext uri="{FF2B5EF4-FFF2-40B4-BE49-F238E27FC236}">
@@ -7177,7 +8318,7 @@
             <a:fld id="{0970407D-EE58-4A0B-824B-1D3AE42DD9CF}" type="slidenum">
               <a:rPr lang="cs-CZ" altLang="cs-CZ" smtClean="0"/>
               <a:pPr/>
-              <a:t>4</a:t>
+              <a:t>6</a:t>
             </a:fld>
             <a:endParaRPr lang="cs-CZ" altLang="cs-CZ" dirty="0"/>
           </a:p>
@@ -7306,7 +8447,171 @@
 </p:sld>
 </file>
 
-<file path=ppt/slides/slide5.xml><?xml version="1.0" encoding="utf-8"?>
+<file path=ppt/slides/slide7.xml><?xml version="1.0" encoding="utf-8"?>
+<p:sld xmlns:a="http://schemas.openxmlformats.org/drawingml/2006/main" xmlns:r="http://schemas.openxmlformats.org/officeDocument/2006/relationships" xmlns:p="http://schemas.openxmlformats.org/presentationml/2006/main">
+  <p:cSld>
+    <p:spTree>
+      <p:nvGrpSpPr>
+        <p:cNvPr id="1" name=""/>
+        <p:cNvGrpSpPr/>
+        <p:nvPr/>
+      </p:nvGrpSpPr>
+      <p:grpSpPr>
+        <a:xfrm>
+          <a:off x="0" y="0"/>
+          <a:ext cx="0" cy="0"/>
+          <a:chOff x="0" y="0"/>
+          <a:chExt cx="0" cy="0"/>
+        </a:xfrm>
+      </p:grpSpPr>
+      <p:sp>
+        <p:nvSpPr>
+          <p:cNvPr id="2" name="Zástupný symbol pro zápatí 1">
+            <a:extLst>
+              <a:ext uri="{FF2B5EF4-FFF2-40B4-BE49-F238E27FC236}">
+                <a16:creationId xmlns:a16="http://schemas.microsoft.com/office/drawing/2014/main" id="{051E91BD-3027-297A-7AFE-8906DF937EF8}"/>
+              </a:ext>
+            </a:extLst>
+          </p:cNvPr>
+          <p:cNvSpPr>
+            <a:spLocks noGrp="1"/>
+          </p:cNvSpPr>
+          <p:nvPr>
+            <p:ph type="ftr" sz="quarter" idx="10"/>
+          </p:nvPr>
+        </p:nvSpPr>
+        <p:spPr/>
+        <p:txBody>
+          <a:bodyPr/>
+          <a:lstStyle/>
+          <a:p>
+            <a:r>
+              <a:rPr lang="cs-CZ"/>
+              <a:t>Zápatí prezentace</a:t>
+            </a:r>
+            <a:endParaRPr lang="cs-CZ" dirty="0"/>
+          </a:p>
+        </p:txBody>
+      </p:sp>
+      <p:sp>
+        <p:nvSpPr>
+          <p:cNvPr id="3" name="Zástupný symbol pro číslo snímku 2">
+            <a:extLst>
+              <a:ext uri="{FF2B5EF4-FFF2-40B4-BE49-F238E27FC236}">
+                <a16:creationId xmlns:a16="http://schemas.microsoft.com/office/drawing/2014/main" id="{596A2848-390C-1B2A-6227-259A794B0451}"/>
+              </a:ext>
+            </a:extLst>
+          </p:cNvPr>
+          <p:cNvSpPr>
+            <a:spLocks noGrp="1"/>
+          </p:cNvSpPr>
+          <p:nvPr>
+            <p:ph type="sldNum" sz="quarter" idx="11"/>
+          </p:nvPr>
+        </p:nvSpPr>
+        <p:spPr/>
+        <p:txBody>
+          <a:bodyPr/>
+          <a:lstStyle/>
+          <a:p>
+            <a:fld id="{0970407D-EE58-4A0B-824B-1D3AE42DD9CF}" type="slidenum">
+              <a:rPr lang="cs-CZ" altLang="cs-CZ"/>
+              <a:pPr/>
+              <a:t>7</a:t>
+            </a:fld>
+            <a:endParaRPr lang="cs-CZ" altLang="cs-CZ" dirty="0"/>
+          </a:p>
+        </p:txBody>
+      </p:sp>
+      <p:sp>
+        <p:nvSpPr>
+          <p:cNvPr id="4" name="Nadpis 3">
+            <a:extLst>
+              <a:ext uri="{FF2B5EF4-FFF2-40B4-BE49-F238E27FC236}">
+                <a16:creationId xmlns:a16="http://schemas.microsoft.com/office/drawing/2014/main" id="{065A5CE8-C4D3-F430-3AAC-E12BBEA8EBB8}"/>
+              </a:ext>
+            </a:extLst>
+          </p:cNvPr>
+          <p:cNvSpPr>
+            <a:spLocks noGrp="1"/>
+          </p:cNvSpPr>
+          <p:nvPr>
+            <p:ph type="title"/>
+          </p:nvPr>
+        </p:nvSpPr>
+        <p:spPr/>
+        <p:txBody>
+          <a:bodyPr/>
+          <a:lstStyle/>
+          <a:p>
+            <a:r>
+              <a:rPr lang="cs-CZ" dirty="0" err="1">
+                <a:cs typeface="Arial"/>
+              </a:rPr>
+              <a:t>Result</a:t>
+            </a:r>
+            <a:r>
+              <a:rPr lang="cs-CZ" dirty="0">
+                <a:cs typeface="Arial"/>
+              </a:rPr>
+              <a:t> ROC </a:t>
+            </a:r>
+            <a:r>
+              <a:rPr lang="cs-CZ" dirty="0" err="1">
+                <a:cs typeface="Arial"/>
+              </a:rPr>
+              <a:t>Curve</a:t>
+            </a:r>
+            <a:endParaRPr lang="cs-CZ" dirty="0" err="1"/>
+          </a:p>
+        </p:txBody>
+      </p:sp>
+      <p:pic>
+        <p:nvPicPr>
+          <p:cNvPr id="6" name="Zástupný obsah 5" descr="Obsah obrázku text, diagram, Vykreslený graf, řada/pruh&#10;&#10;Obsah generovaný pomocí AI může být nesprávný.">
+            <a:extLst>
+              <a:ext uri="{FF2B5EF4-FFF2-40B4-BE49-F238E27FC236}">
+                <a16:creationId xmlns:a16="http://schemas.microsoft.com/office/drawing/2014/main" id="{94AEC1B2-7095-9DE7-8D8C-2A74032A5A53}"/>
+              </a:ext>
+            </a:extLst>
+          </p:cNvPr>
+          <p:cNvPicPr>
+            <a:picLocks noGrp="1" noChangeAspect="1"/>
+          </p:cNvPicPr>
+          <p:nvPr>
+            <p:ph idx="1"/>
+          </p:nvPr>
+        </p:nvPicPr>
+        <p:blipFill>
+          <a:blip r:embed="rId2"/>
+          <a:stretch>
+            <a:fillRect/>
+          </a:stretch>
+        </p:blipFill>
+        <p:spPr>
+          <a:xfrm>
+            <a:off x="3048600" y="1973634"/>
+            <a:ext cx="6096000" cy="3576735"/>
+          </a:xfrm>
+          <a:prstGeom prst="rect">
+            <a:avLst/>
+          </a:prstGeom>
+        </p:spPr>
+      </p:pic>
+    </p:spTree>
+    <p:extLst>
+      <p:ext uri="{BB962C8B-B14F-4D97-AF65-F5344CB8AC3E}">
+        <p14:creationId xmlns:p14="http://schemas.microsoft.com/office/powerpoint/2010/main" val="522991832"/>
+      </p:ext>
+    </p:extLst>
+  </p:cSld>
+  <p:clrMapOvr>
+    <a:masterClrMapping/>
+  </p:clrMapOvr>
+</p:sld>
+</file>
+
+<file path=ppt/slides/slide8.xml><?xml version="1.0" encoding="utf-8"?>
 <p:sld xmlns:a="http://schemas.openxmlformats.org/drawingml/2006/main" xmlns:r="http://schemas.openxmlformats.org/officeDocument/2006/relationships" xmlns:p="http://schemas.openxmlformats.org/presentationml/2006/main">
   <p:cSld>
     <p:spTree>
@@ -7378,7 +8683,7 @@
             <a:fld id="{0970407D-EE58-4A0B-824B-1D3AE42DD9CF}" type="slidenum">
               <a:rPr lang="cs-CZ" altLang="cs-CZ" smtClean="0"/>
               <a:pPr/>
-              <a:t>5</a:t>
+              <a:t>8</a:t>
             </a:fld>
             <a:endParaRPr lang="cs-CZ" altLang="cs-CZ" dirty="0"/>
           </a:p>
@@ -7497,18 +8802,12 @@
 </p:sld>
 </file>
 
-<file path=ppt/slides/slide6.xml><?xml version="1.0" encoding="utf-8"?>
+<file path=ppt/slides/slide9.xml><?xml version="1.0" encoding="utf-8"?>
 <p:sld xmlns:a="http://schemas.openxmlformats.org/drawingml/2006/main" xmlns:r="http://schemas.openxmlformats.org/officeDocument/2006/relationships" xmlns:p="http://schemas.openxmlformats.org/presentationml/2006/main">
   <p:cSld>
     <p:spTree>
       <p:nvGrpSpPr>
-        <p:cNvPr id="1" name="">
-          <a:extLst>
-            <a:ext uri="{FF2B5EF4-FFF2-40B4-BE49-F238E27FC236}">
-              <a16:creationId xmlns:a16="http://schemas.microsoft.com/office/drawing/2014/main" id="{B190E851-1CC3-543A-C969-C59DB152B418}"/>
-            </a:ext>
-          </a:extLst>
-        </p:cNvPr>
+        <p:cNvPr id="1" name=""/>
         <p:cNvGrpSpPr/>
         <p:nvPr/>
       </p:nvGrpSpPr>
@@ -7522,10 +8821,10 @@
       </p:grpSpPr>
       <p:sp>
         <p:nvSpPr>
-          <p:cNvPr id="2" name="Footer Placeholder 1">
-            <a:extLst>
-              <a:ext uri="{FF2B5EF4-FFF2-40B4-BE49-F238E27FC236}">
-                <a16:creationId xmlns:a16="http://schemas.microsoft.com/office/drawing/2014/main" id="{B3C52F1C-666F-EF70-C429-3ED984DD298B}"/>
+          <p:cNvPr id="2" name="Zástupný symbol pro zápatí 1">
+            <a:extLst>
+              <a:ext uri="{FF2B5EF4-FFF2-40B4-BE49-F238E27FC236}">
+                <a16:creationId xmlns:a16="http://schemas.microsoft.com/office/drawing/2014/main" id="{E95A4F53-9C13-4367-32D9-21D1352CD004}"/>
               </a:ext>
             </a:extLst>
           </p:cNvPr>
@@ -7541,16 +8840,20 @@
           <a:bodyPr/>
           <a:lstStyle/>
           <a:p>
+            <a:r>
+              <a:rPr lang="cs-CZ"/>
+              <a:t>Zápatí prezentace</a:t>
+            </a:r>
             <a:endParaRPr lang="cs-CZ" dirty="0"/>
           </a:p>
         </p:txBody>
       </p:sp>
       <p:sp>
         <p:nvSpPr>
-          <p:cNvPr id="3" name="Slide Number Placeholder 2">
-            <a:extLst>
-              <a:ext uri="{FF2B5EF4-FFF2-40B4-BE49-F238E27FC236}">
-                <a16:creationId xmlns:a16="http://schemas.microsoft.com/office/drawing/2014/main" id="{412BDF86-9E0C-A55A-477A-4FF8FC21FFED}"/>
+          <p:cNvPr id="3" name="Zástupný symbol pro číslo snímku 2">
+            <a:extLst>
+              <a:ext uri="{FF2B5EF4-FFF2-40B4-BE49-F238E27FC236}">
+                <a16:creationId xmlns:a16="http://schemas.microsoft.com/office/drawing/2014/main" id="{6E6B9A52-676E-1822-ED85-A12E39705387}"/>
               </a:ext>
             </a:extLst>
           </p:cNvPr>
@@ -7567,9 +8870,9 @@
           <a:lstStyle/>
           <a:p>
             <a:fld id="{0970407D-EE58-4A0B-824B-1D3AE42DD9CF}" type="slidenum">
-              <a:rPr lang="cs-CZ" altLang="cs-CZ" smtClean="0"/>
+              <a:rPr lang="cs-CZ" altLang="cs-CZ"/>
               <a:pPr/>
-              <a:t>6</a:t>
+              <a:t>9</a:t>
             </a:fld>
             <a:endParaRPr lang="cs-CZ" altLang="cs-CZ" dirty="0"/>
           </a:p>
@@ -7577,10 +8880,10 @@
       </p:sp>
       <p:sp>
         <p:nvSpPr>
-          <p:cNvPr id="4" name="Title 3">
-            <a:extLst>
-              <a:ext uri="{FF2B5EF4-FFF2-40B4-BE49-F238E27FC236}">
-                <a16:creationId xmlns:a16="http://schemas.microsoft.com/office/drawing/2014/main" id="{73AD12D2-75FD-5A39-A074-F7FD4FE68317}"/>
+          <p:cNvPr id="4" name="Nadpis 3">
+            <a:extLst>
+              <a:ext uri="{FF2B5EF4-FFF2-40B4-BE49-F238E27FC236}">
+                <a16:creationId xmlns:a16="http://schemas.microsoft.com/office/drawing/2014/main" id="{5BB80848-377F-893F-3A50-79DDBD53A3FA}"/>
               </a:ext>
             </a:extLst>
           </p:cNvPr>
@@ -7597,486 +8900,63 @@
           <a:lstStyle/>
           <a:p>
             <a:r>
-              <a:rPr lang="en-CZ" dirty="0"/>
-              <a:t>Challenger Model (LASSO)</a:t>
-            </a:r>
-          </a:p>
-        </p:txBody>
-      </p:sp>
-      <p:sp>
-        <p:nvSpPr>
-          <p:cNvPr id="5" name="Content Placeholder 4">
-            <a:extLst>
-              <a:ext uri="{FF2B5EF4-FFF2-40B4-BE49-F238E27FC236}">
-                <a16:creationId xmlns:a16="http://schemas.microsoft.com/office/drawing/2014/main" id="{65F9F921-CE42-58B3-272D-7145E4FAFC86}"/>
-              </a:ext>
-            </a:extLst>
-          </p:cNvPr>
-          <p:cNvSpPr>
-            <a:spLocks noGrp="1"/>
-          </p:cNvSpPr>
+              <a:rPr lang="cs-CZ" dirty="0">
+                <a:cs typeface="Arial"/>
+              </a:rPr>
+              <a:t>PSI </a:t>
+            </a:r>
+            <a:r>
+              <a:rPr lang="cs-CZ" dirty="0" err="1">
+                <a:cs typeface="Arial"/>
+              </a:rPr>
+              <a:t>Deployment</a:t>
+            </a:r>
+            <a:r>
+              <a:rPr lang="cs-CZ" dirty="0">
+                <a:cs typeface="Arial"/>
+              </a:rPr>
+              <a:t> chart</a:t>
+            </a:r>
+            <a:endParaRPr lang="cs-CZ" dirty="0"/>
+          </a:p>
+        </p:txBody>
+      </p:sp>
+      <p:pic>
+        <p:nvPicPr>
+          <p:cNvPr id="6" name="Zástupný obsah 5" descr="Obsah obrázku text, snímek obrazovky, diagram, Vykreslený graf&#10;&#10;Obsah generovaný pomocí AI může být nesprávný.">
+            <a:extLst>
+              <a:ext uri="{FF2B5EF4-FFF2-40B4-BE49-F238E27FC236}">
+                <a16:creationId xmlns:a16="http://schemas.microsoft.com/office/drawing/2014/main" id="{9FEE8041-8DAA-8C3E-3557-29913F22D39F}"/>
+              </a:ext>
+            </a:extLst>
+          </p:cNvPr>
+          <p:cNvPicPr>
+            <a:picLocks noGrp="1" noChangeAspect="1"/>
+          </p:cNvPicPr>
           <p:nvPr>
             <p:ph idx="1"/>
           </p:nvPr>
-        </p:nvSpPr>
-        <p:spPr/>
-        <p:txBody>
-          <a:bodyPr/>
-          <a:lstStyle/>
-          <a:p>
-            <a:pPr>
-              <a:buFont typeface="Arial" panose="020B0604020202020204" pitchFamily="34" charset="0"/>
-              <a:buChar char="•"/>
-            </a:pPr>
-            <a:r>
-              <a:rPr lang="en-CZ" b="1" dirty="0"/>
-              <a:t>LASSO Regression</a:t>
-            </a:r>
-          </a:p>
-          <a:p>
-            <a:pPr lvl="1">
-              <a:buFont typeface="Arial" panose="020B0604020202020204" pitchFamily="34" charset="0"/>
-              <a:buChar char="•"/>
-            </a:pPr>
-            <a:r>
-              <a:rPr lang="en-CZ" sz="2600" dirty="0"/>
-              <a:t>Compare Machine Learning and Standard Regression (Stepwise)</a:t>
-            </a:r>
-          </a:p>
-          <a:p>
-            <a:pPr>
-              <a:buFont typeface="Arial" panose="020B0604020202020204" pitchFamily="34" charset="0"/>
-              <a:buChar char="•"/>
-            </a:pPr>
-            <a:r>
-              <a:rPr lang="en-CZ" sz="3200" b="1" dirty="0"/>
-              <a:t>Results</a:t>
-            </a:r>
-          </a:p>
-          <a:p>
-            <a:pPr lvl="1">
-              <a:buFont typeface="Arial" panose="020B0604020202020204" pitchFamily="34" charset="0"/>
-              <a:buChar char="•"/>
-            </a:pPr>
-            <a:r>
-              <a:rPr lang="en-CZ" sz="2600" dirty="0"/>
-              <a:t>Stepwise 44.51% GINI</a:t>
-            </a:r>
-          </a:p>
-          <a:p>
-            <a:pPr lvl="1">
-              <a:buFont typeface="Arial" panose="020B0604020202020204" pitchFamily="34" charset="0"/>
-              <a:buChar char="•"/>
-            </a:pPr>
-            <a:r>
-              <a:rPr lang="en-CZ" sz="2600" dirty="0"/>
-              <a:t>LASSO 44.51% GINI</a:t>
-            </a:r>
-          </a:p>
-          <a:p>
-            <a:pPr>
-              <a:buFont typeface="Arial" panose="020B0604020202020204" pitchFamily="34" charset="0"/>
-              <a:buChar char="•"/>
-            </a:pPr>
-            <a:r>
-              <a:rPr lang="en-CZ" b="1" dirty="0"/>
-              <a:t>Same Model Selection/Performance</a:t>
-            </a:r>
-          </a:p>
-          <a:p>
-            <a:pPr>
-              <a:buFont typeface="Arial" panose="020B0604020202020204" pitchFamily="34" charset="0"/>
-              <a:buChar char="•"/>
-            </a:pPr>
-            <a:endParaRPr lang="en-CZ" dirty="0"/>
-          </a:p>
-        </p:txBody>
-      </p:sp>
+        </p:nvPicPr>
+        <p:blipFill>
+          <a:blip r:embed="rId2"/>
+          <a:stretch>
+            <a:fillRect/>
+          </a:stretch>
+        </p:blipFill>
+        <p:spPr>
+          <a:xfrm>
+            <a:off x="2587637" y="1522078"/>
+            <a:ext cx="7441259" cy="4366957"/>
+          </a:xfrm>
+          <a:prstGeom prst="rect">
+            <a:avLst/>
+          </a:prstGeom>
+        </p:spPr>
+      </p:pic>
     </p:spTree>
     <p:extLst>
       <p:ext uri="{BB962C8B-B14F-4D97-AF65-F5344CB8AC3E}">
-        <p14:creationId xmlns:p14="http://schemas.microsoft.com/office/powerpoint/2010/main" val="2021897682"/>
-      </p:ext>
-    </p:extLst>
-  </p:cSld>
-  <p:clrMapOvr>
-    <a:masterClrMapping/>
-  </p:clrMapOvr>
-</p:sld>
-</file>
-
-<file path=ppt/slides/slide7.xml><?xml version="1.0" encoding="utf-8"?>
-<p:sld xmlns:a="http://schemas.openxmlformats.org/drawingml/2006/main" xmlns:r="http://schemas.openxmlformats.org/officeDocument/2006/relationships" xmlns:p="http://schemas.openxmlformats.org/presentationml/2006/main">
-  <p:cSld>
-    <p:spTree>
-      <p:nvGrpSpPr>
-        <p:cNvPr id="1" name="">
-          <a:extLst>
-            <a:ext uri="{FF2B5EF4-FFF2-40B4-BE49-F238E27FC236}">
-              <a16:creationId xmlns:a16="http://schemas.microsoft.com/office/drawing/2014/main" id="{7560FF15-CAC9-E89A-DABE-F8E95FD35475}"/>
-            </a:ext>
-          </a:extLst>
-        </p:cNvPr>
-        <p:cNvGrpSpPr/>
-        <p:nvPr/>
-      </p:nvGrpSpPr>
-      <p:grpSpPr>
-        <a:xfrm>
-          <a:off x="0" y="0"/>
-          <a:ext cx="0" cy="0"/>
-          <a:chOff x="0" y="0"/>
-          <a:chExt cx="0" cy="0"/>
-        </a:xfrm>
-      </p:grpSpPr>
-      <p:sp>
-        <p:nvSpPr>
-          <p:cNvPr id="2" name="Footer Placeholder 1">
-            <a:extLst>
-              <a:ext uri="{FF2B5EF4-FFF2-40B4-BE49-F238E27FC236}">
-                <a16:creationId xmlns:a16="http://schemas.microsoft.com/office/drawing/2014/main" id="{3F2DF2F1-060E-211C-74C8-87FE1DB92DC6}"/>
-              </a:ext>
-            </a:extLst>
-          </p:cNvPr>
-          <p:cNvSpPr>
-            <a:spLocks noGrp="1"/>
-          </p:cNvSpPr>
-          <p:nvPr>
-            <p:ph type="ftr" sz="quarter" idx="10"/>
-          </p:nvPr>
-        </p:nvSpPr>
-        <p:spPr/>
-        <p:txBody>
-          <a:bodyPr/>
-          <a:lstStyle/>
-          <a:p>
-            <a:endParaRPr lang="cs-CZ" dirty="0"/>
-          </a:p>
-        </p:txBody>
-      </p:sp>
-      <p:sp>
-        <p:nvSpPr>
-          <p:cNvPr id="3" name="Slide Number Placeholder 2">
-            <a:extLst>
-              <a:ext uri="{FF2B5EF4-FFF2-40B4-BE49-F238E27FC236}">
-                <a16:creationId xmlns:a16="http://schemas.microsoft.com/office/drawing/2014/main" id="{C73E2FB3-0E20-61DD-34D6-9B2F5B7F87EC}"/>
-              </a:ext>
-            </a:extLst>
-          </p:cNvPr>
-          <p:cNvSpPr>
-            <a:spLocks noGrp="1"/>
-          </p:cNvSpPr>
-          <p:nvPr>
-            <p:ph type="sldNum" sz="quarter" idx="11"/>
-          </p:nvPr>
-        </p:nvSpPr>
-        <p:spPr/>
-        <p:txBody>
-          <a:bodyPr/>
-          <a:lstStyle/>
-          <a:p>
-            <a:fld id="{0970407D-EE58-4A0B-824B-1D3AE42DD9CF}" type="slidenum">
-              <a:rPr lang="cs-CZ" altLang="cs-CZ" smtClean="0"/>
-              <a:pPr/>
-              <a:t>7</a:t>
-            </a:fld>
-            <a:endParaRPr lang="cs-CZ" altLang="cs-CZ" dirty="0"/>
-          </a:p>
-        </p:txBody>
-      </p:sp>
-      <p:sp>
-        <p:nvSpPr>
-          <p:cNvPr id="4" name="Title 3">
-            <a:extLst>
-              <a:ext uri="{FF2B5EF4-FFF2-40B4-BE49-F238E27FC236}">
-                <a16:creationId xmlns:a16="http://schemas.microsoft.com/office/drawing/2014/main" id="{A083CF8F-2CB7-880E-7CF0-9EC5011D8EE7}"/>
-              </a:ext>
-            </a:extLst>
-          </p:cNvPr>
-          <p:cNvSpPr>
-            <a:spLocks noGrp="1"/>
-          </p:cNvSpPr>
-          <p:nvPr>
-            <p:ph type="title"/>
-          </p:nvPr>
-        </p:nvSpPr>
-        <p:spPr/>
-        <p:txBody>
-          <a:bodyPr/>
-          <a:lstStyle/>
-          <a:p>
-            <a:r>
-              <a:rPr lang="en-CZ" dirty="0"/>
-              <a:t>Summary</a:t>
-            </a:r>
-          </a:p>
-        </p:txBody>
-      </p:sp>
-      <p:sp>
-        <p:nvSpPr>
-          <p:cNvPr id="5" name="Content Placeholder 4">
-            <a:extLst>
-              <a:ext uri="{FF2B5EF4-FFF2-40B4-BE49-F238E27FC236}">
-                <a16:creationId xmlns:a16="http://schemas.microsoft.com/office/drawing/2014/main" id="{8EB12ED1-D642-FC50-8A60-D2F0F3F283D4}"/>
-              </a:ext>
-            </a:extLst>
-          </p:cNvPr>
-          <p:cNvSpPr>
-            <a:spLocks noGrp="1"/>
-          </p:cNvSpPr>
-          <p:nvPr>
-            <p:ph idx="1"/>
-          </p:nvPr>
-        </p:nvSpPr>
-        <p:spPr/>
-        <p:txBody>
-          <a:bodyPr/>
-          <a:lstStyle/>
-          <a:p>
-            <a:pPr>
-              <a:buFont typeface="Arial" panose="020B0604020202020204" pitchFamily="34" charset="0"/>
-              <a:buChar char="•"/>
-            </a:pPr>
-            <a:r>
-              <a:rPr lang="en-CZ" dirty="0"/>
-              <a:t>Target 12-Month Window (Default = 1)</a:t>
-            </a:r>
-          </a:p>
-          <a:p>
-            <a:pPr>
-              <a:buFont typeface="Arial" panose="020B0604020202020204" pitchFamily="34" charset="0"/>
-              <a:buChar char="•"/>
-            </a:pPr>
-            <a:r>
-              <a:rPr lang="en-CZ" dirty="0"/>
-              <a:t>Stratified Random Split (70/30) with WoE Binning</a:t>
-            </a:r>
-          </a:p>
-          <a:p>
-            <a:pPr>
-              <a:buFont typeface="Arial" panose="020B0604020202020204" pitchFamily="34" charset="0"/>
-              <a:buChar char="•"/>
-            </a:pPr>
-            <a:r>
-              <a:rPr lang="en-CZ" dirty="0"/>
-              <a:t>Stepwise Logistic Regression (AIC Selection)</a:t>
-            </a:r>
-          </a:p>
-          <a:p>
-            <a:pPr>
-              <a:buFont typeface="Arial" panose="020B0604020202020204" pitchFamily="34" charset="0"/>
-              <a:buChar char="•"/>
-            </a:pPr>
-            <a:r>
-              <a:rPr lang="en-CZ" dirty="0"/>
-              <a:t>Checks for Correlation and VIF</a:t>
-            </a:r>
-          </a:p>
-          <a:p>
-            <a:pPr>
-              <a:buFont typeface="Arial" panose="020B0604020202020204" pitchFamily="34" charset="0"/>
-              <a:buChar char="•"/>
-            </a:pPr>
-            <a:r>
-              <a:rPr lang="en-CZ" dirty="0"/>
-              <a:t>GINI 44.5% (Strong predictive power)</a:t>
-            </a:r>
-          </a:p>
-          <a:p>
-            <a:pPr>
-              <a:buFont typeface="Arial" panose="020B0604020202020204" pitchFamily="34" charset="0"/>
-              <a:buChar char="•"/>
-            </a:pPr>
-            <a:r>
-              <a:rPr lang="en-CZ" dirty="0"/>
-              <a:t>No Gap between Train/Test (Robust)</a:t>
-            </a:r>
-          </a:p>
-          <a:p>
-            <a:pPr>
-              <a:buFont typeface="Arial" panose="020B0604020202020204" pitchFamily="34" charset="0"/>
-              <a:buChar char="•"/>
-            </a:pPr>
-            <a:r>
-              <a:rPr lang="en-CZ" dirty="0"/>
-              <a:t>PSI 0.05 on Blind Data (Stability)</a:t>
-            </a:r>
-          </a:p>
-          <a:p>
-            <a:pPr>
-              <a:buFont typeface="Arial" panose="020B0604020202020204" pitchFamily="34" charset="0"/>
-              <a:buChar char="•"/>
-            </a:pPr>
-            <a:r>
-              <a:rPr lang="en-CZ" dirty="0"/>
-              <a:t>ML LASSO Same Performance</a:t>
-            </a:r>
-          </a:p>
-          <a:p>
-            <a:pPr>
-              <a:buFont typeface="Arial" panose="020B0604020202020204" pitchFamily="34" charset="0"/>
-              <a:buChar char="•"/>
-            </a:pPr>
-            <a:endParaRPr lang="en-CZ" dirty="0"/>
-          </a:p>
-        </p:txBody>
-      </p:sp>
-    </p:spTree>
-    <p:extLst>
-      <p:ext uri="{BB962C8B-B14F-4D97-AF65-F5344CB8AC3E}">
-        <p14:creationId xmlns:p14="http://schemas.microsoft.com/office/powerpoint/2010/main" val="1233207359"/>
-      </p:ext>
-    </p:extLst>
-  </p:cSld>
-  <p:clrMapOvr>
-    <a:masterClrMapping/>
-  </p:clrMapOvr>
-</p:sld>
-</file>
-
-<file path=ppt/slides/slide8.xml><?xml version="1.0" encoding="utf-8"?>
-<p:sld xmlns:a="http://schemas.openxmlformats.org/drawingml/2006/main" xmlns:r="http://schemas.openxmlformats.org/officeDocument/2006/relationships" xmlns:p="http://schemas.openxmlformats.org/presentationml/2006/main">
-  <p:cSld>
-    <p:spTree>
-      <p:nvGrpSpPr>
-        <p:cNvPr id="1" name="">
-          <a:extLst>
-            <a:ext uri="{FF2B5EF4-FFF2-40B4-BE49-F238E27FC236}">
-              <a16:creationId xmlns:a16="http://schemas.microsoft.com/office/drawing/2014/main" id="{B42E7432-DB6E-CF97-D96C-B06FC96989F7}"/>
-            </a:ext>
-          </a:extLst>
-        </p:cNvPr>
-        <p:cNvGrpSpPr/>
-        <p:nvPr/>
-      </p:nvGrpSpPr>
-      <p:grpSpPr>
-        <a:xfrm>
-          <a:off x="0" y="0"/>
-          <a:ext cx="0" cy="0"/>
-          <a:chOff x="0" y="0"/>
-          <a:chExt cx="0" cy="0"/>
-        </a:xfrm>
-      </p:grpSpPr>
-      <p:sp>
-        <p:nvSpPr>
-          <p:cNvPr id="2" name="Footer Placeholder 1">
-            <a:extLst>
-              <a:ext uri="{FF2B5EF4-FFF2-40B4-BE49-F238E27FC236}">
-                <a16:creationId xmlns:a16="http://schemas.microsoft.com/office/drawing/2014/main" id="{A9674981-1D35-EF3B-4584-4BA0FEB42834}"/>
-              </a:ext>
-            </a:extLst>
-          </p:cNvPr>
-          <p:cNvSpPr>
-            <a:spLocks noGrp="1"/>
-          </p:cNvSpPr>
-          <p:nvPr>
-            <p:ph type="ftr" sz="quarter" idx="10"/>
-          </p:nvPr>
-        </p:nvSpPr>
-        <p:spPr/>
-        <p:txBody>
-          <a:bodyPr/>
-          <a:lstStyle/>
-          <a:p>
-            <a:endParaRPr lang="cs-CZ" dirty="0"/>
-          </a:p>
-        </p:txBody>
-      </p:sp>
-      <p:sp>
-        <p:nvSpPr>
-          <p:cNvPr id="3" name="Slide Number Placeholder 2">
-            <a:extLst>
-              <a:ext uri="{FF2B5EF4-FFF2-40B4-BE49-F238E27FC236}">
-                <a16:creationId xmlns:a16="http://schemas.microsoft.com/office/drawing/2014/main" id="{5D807617-6DBF-7FC0-B1B9-427A24EE7C9C}"/>
-              </a:ext>
-            </a:extLst>
-          </p:cNvPr>
-          <p:cNvSpPr>
-            <a:spLocks noGrp="1"/>
-          </p:cNvSpPr>
-          <p:nvPr>
-            <p:ph type="sldNum" sz="quarter" idx="11"/>
-          </p:nvPr>
-        </p:nvSpPr>
-        <p:spPr/>
-        <p:txBody>
-          <a:bodyPr/>
-          <a:lstStyle/>
-          <a:p>
-            <a:fld id="{0970407D-EE58-4A0B-824B-1D3AE42DD9CF}" type="slidenum">
-              <a:rPr lang="cs-CZ" altLang="cs-CZ" smtClean="0"/>
-              <a:pPr/>
-              <a:t>8</a:t>
-            </a:fld>
-            <a:endParaRPr lang="cs-CZ" altLang="cs-CZ" dirty="0"/>
-          </a:p>
-        </p:txBody>
-      </p:sp>
-      <p:sp>
-        <p:nvSpPr>
-          <p:cNvPr id="4" name="Title 3">
-            <a:extLst>
-              <a:ext uri="{FF2B5EF4-FFF2-40B4-BE49-F238E27FC236}">
-                <a16:creationId xmlns:a16="http://schemas.microsoft.com/office/drawing/2014/main" id="{47FE0764-65CF-D401-6320-156B53426A5A}"/>
-              </a:ext>
-            </a:extLst>
-          </p:cNvPr>
-          <p:cNvSpPr>
-            <a:spLocks noGrp="1"/>
-          </p:cNvSpPr>
-          <p:nvPr>
-            <p:ph type="title"/>
-          </p:nvPr>
-        </p:nvSpPr>
-        <p:spPr>
-          <a:xfrm>
-            <a:off x="4755019" y="3310425"/>
-            <a:ext cx="2681961" cy="451576"/>
-          </a:xfrm>
-        </p:spPr>
-        <p:txBody>
-          <a:bodyPr/>
-          <a:lstStyle/>
-          <a:p>
-            <a:r>
-              <a:rPr lang="en-CZ" dirty="0"/>
-              <a:t>Thank You</a:t>
-            </a:r>
-          </a:p>
-        </p:txBody>
-      </p:sp>
-      <p:sp>
-        <p:nvSpPr>
-          <p:cNvPr id="5" name="Content Placeholder 4">
-            <a:extLst>
-              <a:ext uri="{FF2B5EF4-FFF2-40B4-BE49-F238E27FC236}">
-                <a16:creationId xmlns:a16="http://schemas.microsoft.com/office/drawing/2014/main" id="{37F7924D-3BB6-F27D-7B0B-79CD01E6D156}"/>
-              </a:ext>
-            </a:extLst>
-          </p:cNvPr>
-          <p:cNvSpPr>
-            <a:spLocks noGrp="1"/>
-          </p:cNvSpPr>
-          <p:nvPr>
-            <p:ph idx="1"/>
-          </p:nvPr>
-        </p:nvSpPr>
-        <p:spPr/>
-        <p:txBody>
-          <a:bodyPr/>
-          <a:lstStyle/>
-          <a:p>
-            <a:pPr>
-              <a:buFont typeface="Arial" panose="020B0604020202020204" pitchFamily="34" charset="0"/>
-              <a:buChar char="•"/>
-            </a:pPr>
-            <a:endParaRPr lang="en-CZ" dirty="0"/>
-          </a:p>
-        </p:txBody>
-      </p:sp>
-    </p:spTree>
-    <p:extLst>
-      <p:ext uri="{BB962C8B-B14F-4D97-AF65-F5344CB8AC3E}">
-        <p14:creationId xmlns:p14="http://schemas.microsoft.com/office/powerpoint/2010/main" val="1899333622"/>
+        <p14:creationId xmlns:p14="http://schemas.microsoft.com/office/powerpoint/2010/main" val="2343295031"/>
       </p:ext>
     </p:extLst>
   </p:cSld>
@@ -9385,6 +10265,12 @@
 </file>
 
 <file path=customXml/item1.xml><?xml version="1.0" encoding="utf-8"?>
+<p:properties xmlns:p="http://schemas.microsoft.com/office/2006/metadata/properties" xmlns:xsi="http://www.w3.org/2001/XMLSchema-instance" xmlns:pc="http://schemas.microsoft.com/office/infopath/2007/PartnerControls">
+  <documentManagement/>
+</p:properties>
+</file>
+
+<file path=customXml/item2.xml><?xml version="1.0" encoding="utf-8"?>
 <ct:contentTypeSchema xmlns:ct="http://schemas.microsoft.com/office/2006/metadata/contentType" xmlns:ma="http://schemas.microsoft.com/office/2006/metadata/properties/metaAttributes" ct:_="" ma:_="" ma:contentTypeName="Dokument" ma:contentTypeID="0x0101008A8BAC94BA468D488F31B2478A655CDC" ma:contentTypeVersion="3" ma:contentTypeDescription="Vytvoří nový dokument" ma:contentTypeScope="" ma:versionID="59df924ff85e56a9d620f22666450dc4">
   <xsd:schema xmlns:xsd="http://www.w3.org/2001/XMLSchema" xmlns:xs="http://www.w3.org/2001/XMLSchema" xmlns:p="http://schemas.microsoft.com/office/2006/metadata/properties" xmlns:ns2="76d5652a-9cd3-465f-98c7-aa8090bd65c7" targetNamespace="http://schemas.microsoft.com/office/2006/metadata/properties" ma:root="true" ma:fieldsID="ebc375423d16e97435ac953b71c835e3" ns2:_="">
     <xsd:import namespace="76d5652a-9cd3-465f-98c7-aa8090bd65c7"/>
@@ -9522,12 +10408,6 @@
 </ct:contentTypeSchema>
 </file>
 
-<file path=customXml/item2.xml><?xml version="1.0" encoding="utf-8"?>
-<p:properties xmlns:p="http://schemas.microsoft.com/office/2006/metadata/properties" xmlns:xsi="http://www.w3.org/2001/XMLSchema-instance" xmlns:pc="http://schemas.microsoft.com/office/infopath/2007/PartnerControls">
-  <documentManagement/>
-</p:properties>
-</file>
-
 <file path=customXml/item3.xml><?xml version="1.0" encoding="utf-8"?>
 <?mso-contentType ?>
 <FormTemplates xmlns="http://schemas.microsoft.com/sharepoint/v3/contenttype/forms">
@@ -9538,6 +10418,15 @@
 </file>
 
 <file path=customXml/itemProps1.xml><?xml version="1.0" encoding="utf-8"?>
+<ds:datastoreItem xmlns:ds="http://schemas.openxmlformats.org/officeDocument/2006/customXml" ds:itemID="{119BE12D-1FF0-4728-BAAC-DFC1B1DA192D}">
+  <ds:schemaRefs>
+    <ds:schemaRef ds:uri="http://schemas.microsoft.com/office/2006/metadata/properties"/>
+    <ds:schemaRef ds:uri="http://schemas.microsoft.com/office/infopath/2007/PartnerControls"/>
+  </ds:schemaRefs>
+</ds:datastoreItem>
+</file>
+
+<file path=customXml/itemProps2.xml><?xml version="1.0" encoding="utf-8"?>
 <ds:datastoreItem xmlns:ds="http://schemas.openxmlformats.org/officeDocument/2006/customXml" ds:itemID="{6E76D051-344C-43B3-9298-00E7F8F1D6F5}">
   <ds:schemaRefs>
     <ds:schemaRef ds:uri="http://schemas.microsoft.com/office/2006/metadata/contentType"/>
@@ -9555,15 +10444,6 @@
 </ds:datastoreItem>
 </file>
 
-<file path=customXml/itemProps2.xml><?xml version="1.0" encoding="utf-8"?>
-<ds:datastoreItem xmlns:ds="http://schemas.openxmlformats.org/officeDocument/2006/customXml" ds:itemID="{119BE12D-1FF0-4728-BAAC-DFC1B1DA192D}">
-  <ds:schemaRefs>
-    <ds:schemaRef ds:uri="http://schemas.microsoft.com/office/2006/metadata/properties"/>
-    <ds:schemaRef ds:uri="http://schemas.microsoft.com/office/infopath/2007/PartnerControls"/>
-  </ds:schemaRefs>
-</ds:datastoreItem>
-</file>
-
 <file path=customXml/itemProps3.xml><?xml version="1.0" encoding="utf-8"?>
 <ds:datastoreItem xmlns:ds="http://schemas.openxmlformats.org/officeDocument/2006/customXml" ds:itemID="{8FACF606-FF5B-41F4-AEDE-FDD6EBD291C4}">
   <ds:schemaRefs>

</xml_diff>

<commit_message>
final script and presentation version
</commit_message>
<xml_diff>
--- a/APRE_Presentation.pptx
+++ b/APRE_Presentation.pptx
@@ -6828,7 +6828,7 @@
             </a:pPr>
             <a:r>
               <a:rPr lang="en-CZ" sz="2600" dirty="0"/>
-              <a:t>Stepwise 44.51% GINI</a:t>
+              <a:t>Stepwise 44.67% GINI</a:t>
             </a:r>
           </a:p>
           <a:p>
@@ -6838,7 +6838,7 @@
             </a:pPr>
             <a:r>
               <a:rPr lang="en-CZ" sz="2600" dirty="0"/>
-              <a:t>LASSO 44.51% GINI</a:t>
+              <a:t>LASSO 44.67% GINI</a:t>
             </a:r>
           </a:p>
           <a:p>
@@ -6911,10 +6911,6 @@
           <a:bodyPr/>
           <a:lstStyle/>
           <a:p>
-            <a:r>
-              <a:rPr lang="cs-CZ"/>
-              <a:t>Zápatí prezentace</a:t>
-            </a:r>
             <a:endParaRPr lang="cs-CZ" dirty="0"/>
           </a:p>
         </p:txBody>
@@ -7210,7 +7206,7 @@
             </a:pPr>
             <a:r>
               <a:rPr lang="en-CZ" dirty="0"/>
-              <a:t>GINI 44.5% (Strong predictive power)</a:t>
+              <a:t>GINI 44.7% (Strong predictive power)</a:t>
             </a:r>
           </a:p>
           <a:p>
@@ -7230,7 +7226,7 @@
             </a:pPr>
             <a:r>
               <a:rPr lang="en-CZ" dirty="0"/>
-              <a:t>PSI 0.05 on Blind Data (Stability)</a:t>
+              <a:t>PSI 0.07 on Blind Data (Stability)</a:t>
             </a:r>
           </a:p>
           <a:p>
@@ -7813,7 +7809,7 @@
             </a:pPr>
             <a:r>
               <a:rPr lang="en-CZ" sz="2600" dirty="0"/>
-              <a:t>Information Value (IV &gt; 0.02, removed weak predictors)</a:t>
+              <a:t>Information Value (IV &lt; 0.02, removed weak predictors)</a:t>
             </a:r>
           </a:p>
           <a:p>
@@ -7823,7 +7819,7 @@
             </a:pPr>
             <a:r>
               <a:rPr lang="en-CZ" sz="2600" dirty="0"/>
-              <a:t>Correlation (&lt; 0.5, removed redundant features)</a:t>
+              <a:t>Correlation (&gt; 0.5, removed redundant features)</a:t>
             </a:r>
           </a:p>
           <a:p>
@@ -7833,7 +7829,7 @@
             </a:pPr>
             <a:r>
               <a:rPr lang="en-CZ" sz="2600" dirty="0"/>
-              <a:t>Multicollinearity (VIF max 2.05, passes &lt; 5)</a:t>
+              <a:t>Multicollinearity (max VIF 1.75, passes &lt; 5)</a:t>
             </a:r>
           </a:p>
           <a:p>
@@ -7909,10 +7905,7 @@
           <a:bodyPr/>
           <a:lstStyle/>
           <a:p>
-            <a:r>
-              <a:rPr lang="cs-CZ" dirty="0"/>
-              <a:t>Zápatí prezentace</a:t>
-            </a:r>
+            <a:endParaRPr lang="cs-CZ" dirty="0"/>
           </a:p>
         </p:txBody>
       </p:sp>
@@ -8114,10 +8107,6 @@
           <a:bodyPr/>
           <a:lstStyle/>
           <a:p>
-            <a:r>
-              <a:rPr lang="cs-CZ"/>
-              <a:t>Zápatí prezentace</a:t>
-            </a:r>
             <a:endParaRPr lang="cs-CZ" dirty="0"/>
           </a:p>
         </p:txBody>
@@ -8389,7 +8378,7 @@
             </a:pPr>
             <a:r>
               <a:rPr lang="en-CZ" sz="2600" dirty="0"/>
-              <a:t>Train GINI 44.42%</a:t>
+              <a:t>Train GINI 44.76%</a:t>
             </a:r>
           </a:p>
           <a:p>
@@ -8399,7 +8388,7 @@
             </a:pPr>
             <a:r>
               <a:rPr lang="en-CZ" sz="2600" dirty="0"/>
-              <a:t>Test GINI 44.51%</a:t>
+              <a:t>Test GINI 44.67%</a:t>
             </a:r>
           </a:p>
           <a:p>
@@ -8419,7 +8408,7 @@
             </a:pPr>
             <a:r>
               <a:rPr lang="en-CZ" sz="2600" dirty="0"/>
-              <a:t>-0.09 points</a:t>
+              <a:t>0.09 points</a:t>
             </a:r>
           </a:p>
           <a:p>
@@ -8485,10 +8474,6 @@
           <a:bodyPr/>
           <a:lstStyle/>
           <a:p>
-            <a:r>
-              <a:rPr lang="cs-CZ"/>
-              <a:t>Zápatí prezentace</a:t>
-            </a:r>
             <a:endParaRPr lang="cs-CZ" dirty="0"/>
           </a:p>
         </p:txBody>
@@ -8774,7 +8759,7 @@
             </a:pPr>
             <a:r>
               <a:rPr lang="en-CZ" sz="2600" dirty="0"/>
-              <a:t>0.0527 (&lt; 0.10)</a:t>
+              <a:t>0.0686 (&lt; 0.10)</a:t>
             </a:r>
           </a:p>
           <a:p>
@@ -8840,10 +8825,6 @@
           <a:bodyPr/>
           <a:lstStyle/>
           <a:p>
-            <a:r>
-              <a:rPr lang="cs-CZ"/>
-              <a:t>Zápatí prezentace</a:t>
-            </a:r>
             <a:endParaRPr lang="cs-CZ" dirty="0"/>
           </a:p>
         </p:txBody>
@@ -8915,7 +8896,7 @@
               <a:rPr lang="cs-CZ" dirty="0">
                 <a:cs typeface="Arial"/>
               </a:rPr>
-              <a:t> chart</a:t>
+              <a:t> Chart</a:t>
             </a:r>
             <a:endParaRPr lang="cs-CZ" dirty="0"/>
           </a:p>

</xml_diff>